<commit_message>
adds slides from previous week
</commit_message>
<xml_diff>
--- a/slides/creatingFunctions1.pptx
+++ b/slides/creatingFunctions1.pptx
@@ -12,11 +12,13 @@
     <p:sldId id="268" r:id="rId6"/>
     <p:sldId id="260" r:id="rId7"/>
     <p:sldId id="261" r:id="rId8"/>
-    <p:sldId id="262" r:id="rId9"/>
-    <p:sldId id="263" r:id="rId10"/>
-    <p:sldId id="264" r:id="rId11"/>
-    <p:sldId id="266" r:id="rId12"/>
-    <p:sldId id="267" r:id="rId13"/>
+    <p:sldId id="269" r:id="rId9"/>
+    <p:sldId id="270" r:id="rId10"/>
+    <p:sldId id="262" r:id="rId11"/>
+    <p:sldId id="263" r:id="rId12"/>
+    <p:sldId id="264" r:id="rId13"/>
+    <p:sldId id="266" r:id="rId14"/>
+    <p:sldId id="267" r:id="rId15"/>
   </p:sldIdLst>
   <p:sldSz cx="12192000" cy="6858000"/>
   <p:notesSz cx="6858000" cy="9144000"/>
@@ -115,6 +117,11 @@
       </a:defRPr>
     </a:lvl9pPr>
   </p:defaultTextStyle>
+  <p:extLst>
+    <p:ext uri="{EFAFB233-063F-42B5-8137-9DF3F51BA10A}">
+      <p15:sldGuideLst xmlns:p15="http://schemas.microsoft.com/office/powerpoint/2012/main"/>
+    </p:ext>
+  </p:extLst>
 </p:presentation>
 </file>
 
@@ -276,7 +283,7 @@
           <a:p>
             <a:fld id="{655A5808-3B61-48CC-92EF-85AC2E0DFA56}" type="datetime2">
               <a:rPr lang="en-US" smtClean="0"/>
-              <a:t>Wednesday, February 14, 2024</a:t>
+              <a:t>Friday, February 16, 2024</a:t>
             </a:fld>
             <a:endParaRPr lang="en-US"/>
           </a:p>
@@ -474,7 +481,7 @@
           <a:p>
             <a:fld id="{735E98AF-4574-4509-BF7A-519ACD5BF826}" type="datetime2">
               <a:rPr lang="en-US" smtClean="0"/>
-              <a:t>Wednesday, February 14, 2024</a:t>
+              <a:t>Friday, February 16, 2024</a:t>
             </a:fld>
             <a:endParaRPr lang="en-US"/>
           </a:p>
@@ -684,7 +691,7 @@
           <a:p>
             <a:fld id="{93DD97D4-9636-490F-85D0-E926C2B6F3B1}" type="datetime2">
               <a:rPr lang="en-US" smtClean="0"/>
-              <a:t>Wednesday, February 14, 2024</a:t>
+              <a:t>Friday, February 16, 2024</a:t>
             </a:fld>
             <a:endParaRPr lang="en-US"/>
           </a:p>
@@ -883,7 +890,7 @@
           <a:p>
             <a:fld id="{2F3AF3C6-0FD4-4939-991C-00DDE5C56815}" type="datetime2">
               <a:rPr lang="en-US" smtClean="0"/>
-              <a:t>Wednesday, February 14, 2024</a:t>
+              <a:t>Friday, February 16, 2024</a:t>
             </a:fld>
             <a:endParaRPr lang="en-US"/>
           </a:p>
@@ -1164,7 +1171,7 @@
           <a:p>
             <a:fld id="{86807482-8128-47C6-A8DD-6452B0291CFF}" type="datetime2">
               <a:rPr lang="en-US" smtClean="0"/>
-              <a:t>Wednesday, February 14, 2024</a:t>
+              <a:t>Friday, February 16, 2024</a:t>
             </a:fld>
             <a:endParaRPr lang="en-US"/>
           </a:p>
@@ -1432,7 +1439,7 @@
           <a:p>
             <a:fld id="{37903F25-275E-41DE-BE3B-EBF0DB49F9B1}" type="datetime2">
               <a:rPr lang="en-US" smtClean="0"/>
-              <a:t>Wednesday, February 14, 2024</a:t>
+              <a:t>Friday, February 16, 2024</a:t>
             </a:fld>
             <a:endParaRPr lang="en-US"/>
           </a:p>
@@ -1813,7 +1820,7 @@
           <a:p>
             <a:fld id="{EE475572-4A44-4171-84AA-64D42C8050A6}" type="datetime2">
               <a:rPr lang="en-US" smtClean="0"/>
-              <a:t>Wednesday, February 14, 2024</a:t>
+              <a:t>Friday, February 16, 2024</a:t>
             </a:fld>
             <a:endParaRPr lang="en-US"/>
           </a:p>
@@ -1983,7 +1990,7 @@
           <a:p>
             <a:fld id="{C4C1612E-528E-4FD5-9E9E-E15F1108F171}" type="datetime2">
               <a:rPr lang="en-US" smtClean="0"/>
-              <a:t>Wednesday, February 14, 2024</a:t>
+              <a:t>Friday, February 16, 2024</a:t>
             </a:fld>
             <a:endParaRPr lang="en-US"/>
           </a:p>
@@ -2096,7 +2103,7 @@
           <a:p>
             <a:fld id="{D4F6D862-A06D-436F-A92E-EBAAD50B6E50}" type="datetime2">
               <a:rPr lang="en-US" smtClean="0"/>
-              <a:t>Wednesday, February 14, 2024</a:t>
+              <a:t>Friday, February 16, 2024</a:t>
             </a:fld>
             <a:endParaRPr lang="en-US"/>
           </a:p>
@@ -2413,7 +2420,7 @@
           <a:p>
             <a:fld id="{B73E0B7D-2260-4809-8F0A-9E5F3E24F169}" type="datetime2">
               <a:rPr lang="en-US" smtClean="0"/>
-              <a:t>Wednesday, February 14, 2024</a:t>
+              <a:t>Friday, February 16, 2024</a:t>
             </a:fld>
             <a:endParaRPr lang="en-US"/>
           </a:p>
@@ -2705,7 +2712,7 @@
           <a:p>
             <a:fld id="{3C8E4735-C637-46A3-94EB-AB3AC4188D2F}" type="datetime2">
               <a:rPr lang="en-US" smtClean="0"/>
-              <a:t>Wednesday, February 14, 2024</a:t>
+              <a:t>Friday, February 16, 2024</a:t>
             </a:fld>
             <a:endParaRPr lang="en-US"/>
           </a:p>
@@ -3073,7 +3080,7 @@
             <a:fld id="{AE0C963C-C1DB-4AFD-9DDC-0691666BF49B}" type="datetime2">
               <a:rPr lang="en-US" smtClean="0"/>
               <a:pPr/>
-              <a:t>Wednesday, February 14, 2024</a:t>
+              <a:t>Friday, February 16, 2024</a:t>
             </a:fld>
             <a:endParaRPr lang="en-US" cap="all" dirty="0"/>
           </a:p>
@@ -4581,6 +4588,1272 @@
           <p:cNvPr id="2" name="Title 1">
             <a:extLst>
               <a:ext uri="{FF2B5EF4-FFF2-40B4-BE49-F238E27FC236}">
+                <a16:creationId xmlns:a16="http://schemas.microsoft.com/office/drawing/2014/main" id="{244EACCD-6162-3AAD-7D21-E286462AA6D4}"/>
+              </a:ext>
+            </a:extLst>
+          </p:cNvPr>
+          <p:cNvSpPr>
+            <a:spLocks noGrp="1"/>
+          </p:cNvSpPr>
+          <p:nvPr>
+            <p:ph type="title"/>
+          </p:nvPr>
+        </p:nvSpPr>
+        <p:spPr>
+          <a:xfrm>
+            <a:off x="387927" y="1028701"/>
+            <a:ext cx="3248863" cy="3020785"/>
+          </a:xfrm>
+        </p:spPr>
+        <p:txBody>
+          <a:bodyPr>
+            <a:normAutofit/>
+          </a:bodyPr>
+          <a:lstStyle/>
+          <a:p>
+            <a:pPr algn="r"/>
+            <a:r>
+              <a:rPr lang="en-US" sz="3200" dirty="0">
+                <a:solidFill>
+                  <a:schemeClr val="bg1"/>
+                </a:solidFill>
+              </a:rPr>
+              <a:t>Variable life cycle and scope</a:t>
+            </a:r>
+          </a:p>
+        </p:txBody>
+      </p:sp>
+      <p:sp>
+        <p:nvSpPr>
+          <p:cNvPr id="3" name="Content Placeholder 2">
+            <a:extLst>
+              <a:ext uri="{FF2B5EF4-FFF2-40B4-BE49-F238E27FC236}">
+                <a16:creationId xmlns:a16="http://schemas.microsoft.com/office/drawing/2014/main" id="{7498C99E-C5C4-E993-11E2-7B3431194F4D}"/>
+              </a:ext>
+            </a:extLst>
+          </p:cNvPr>
+          <p:cNvSpPr>
+            <a:spLocks noGrp="1"/>
+          </p:cNvSpPr>
+          <p:nvPr>
+            <p:ph idx="1"/>
+          </p:nvPr>
+        </p:nvSpPr>
+        <p:spPr>
+          <a:xfrm>
+            <a:off x="4777409" y="1028701"/>
+            <a:ext cx="6273972" cy="5012869"/>
+          </a:xfrm>
+        </p:spPr>
+        <p:txBody>
+          <a:bodyPr>
+            <a:normAutofit lnSpcReduction="10000"/>
+          </a:bodyPr>
+          <a:lstStyle/>
+          <a:p>
+            <a:r>
+              <a:rPr lang="en-US" sz="1800" dirty="0"/>
+              <a:t>When we start making our own functions we need to keep in mind the </a:t>
+            </a:r>
+            <a:r>
+              <a:rPr lang="en-US" sz="1800" b="1" dirty="0"/>
+              <a:t>scope</a:t>
+            </a:r>
+            <a:r>
+              <a:rPr lang="en-US" sz="1800" dirty="0"/>
+              <a:t> the variable belongs to</a:t>
+            </a:r>
+          </a:p>
+          <a:p>
+            <a:r>
+              <a:rPr lang="en-US" sz="1800" dirty="0"/>
+              <a:t>A variable can be either </a:t>
+            </a:r>
+            <a:r>
+              <a:rPr lang="en-US" sz="1800" i="1" dirty="0"/>
+              <a:t>local</a:t>
+            </a:r>
+            <a:r>
+              <a:rPr lang="en-US" sz="1800" dirty="0"/>
+              <a:t> or </a:t>
+            </a:r>
+            <a:r>
+              <a:rPr lang="en-US" sz="1800" i="1" dirty="0"/>
+              <a:t>global</a:t>
+            </a:r>
+          </a:p>
+          <a:p>
+            <a:pPr lvl="1"/>
+            <a:r>
+              <a:rPr lang="en-US" sz="1800" dirty="0"/>
+              <a:t>A </a:t>
+            </a:r>
+            <a:r>
+              <a:rPr lang="en-US" sz="1800" i="1" dirty="0"/>
+              <a:t>local variable</a:t>
+            </a:r>
+            <a:r>
+              <a:rPr lang="en-US" sz="1800" dirty="0"/>
+              <a:t> is a variable that only exists within a function</a:t>
+            </a:r>
+          </a:p>
+          <a:p>
+            <a:pPr lvl="2"/>
+            <a:r>
+              <a:rPr lang="en-US" sz="1600" dirty="0"/>
+              <a:t>Once the function is no longer running, that variable ceases to exist</a:t>
+            </a:r>
+          </a:p>
+          <a:p>
+            <a:pPr lvl="1"/>
+            <a:r>
+              <a:rPr lang="en-US" sz="1800" dirty="0"/>
+              <a:t>A </a:t>
+            </a:r>
+            <a:r>
+              <a:rPr lang="en-US" sz="1800" i="1" dirty="0"/>
+              <a:t>global variable</a:t>
+            </a:r>
+            <a:r>
+              <a:rPr lang="en-US" sz="1800" dirty="0"/>
+              <a:t> is a variable that can be referred to in any part of our code</a:t>
+            </a:r>
+          </a:p>
+          <a:p>
+            <a:pPr lvl="2"/>
+            <a:r>
+              <a:rPr lang="en-US" sz="1600" dirty="0"/>
+              <a:t>Ideally we want to limit the number of global functions that we have, and instead pass arguments into functions and reference them as parameters</a:t>
+            </a:r>
+          </a:p>
+          <a:p>
+            <a:pPr lvl="1"/>
+            <a:r>
+              <a:rPr lang="en-US" sz="1800" dirty="0"/>
+              <a:t>Using local variables instead of global variables minimizes confusion for the programmer and prevents values from being overwritten</a:t>
+            </a:r>
+          </a:p>
+        </p:txBody>
+      </p:sp>
+    </p:spTree>
+    <p:extLst>
+      <p:ext uri="{BB962C8B-B14F-4D97-AF65-F5344CB8AC3E}">
+        <p14:creationId xmlns:p14="http://schemas.microsoft.com/office/powerpoint/2010/main" val="233753120"/>
+      </p:ext>
+    </p:extLst>
+  </p:cSld>
+  <p:clrMapOvr>
+    <a:masterClrMapping/>
+  </p:clrMapOvr>
+</p:sld>
+</file>
+
+<file path=ppt/slides/slide11.xml><?xml version="1.0" encoding="utf-8"?>
+<p:sld xmlns:a="http://schemas.openxmlformats.org/drawingml/2006/main" xmlns:r="http://schemas.openxmlformats.org/officeDocument/2006/relationships" xmlns:p="http://schemas.openxmlformats.org/presentationml/2006/main">
+  <p:cSld>
+    <p:bg>
+      <p:bgPr>
+        <a:solidFill>
+          <a:schemeClr val="bg1"/>
+        </a:solidFill>
+        <a:effectLst/>
+      </p:bgPr>
+    </p:bg>
+    <p:spTree>
+      <p:nvGrpSpPr>
+        <p:cNvPr id="1" name=""/>
+        <p:cNvGrpSpPr/>
+        <p:nvPr/>
+      </p:nvGrpSpPr>
+      <p:grpSpPr>
+        <a:xfrm>
+          <a:off x="0" y="0"/>
+          <a:ext cx="0" cy="0"/>
+          <a:chOff x="0" y="0"/>
+          <a:chExt cx="0" cy="0"/>
+        </a:xfrm>
+      </p:grpSpPr>
+      <p:sp useBgFill="1">
+        <p:nvSpPr>
+          <p:cNvPr id="8" name="Rectangle 7">
+            <a:extLst>
+              <a:ext uri="{FF2B5EF4-FFF2-40B4-BE49-F238E27FC236}">
+                <a16:creationId xmlns:a16="http://schemas.microsoft.com/office/drawing/2014/main" id="{45C5CC17-FF17-43CF-B073-D9051465D5CC}"/>
+              </a:ext>
+              <a:ext uri="{C183D7F6-B498-43B3-948B-1728B52AA6E4}">
+                <adec:decorative xmlns:adec="http://schemas.microsoft.com/office/drawing/2017/decorative" val="1"/>
+              </a:ext>
+            </a:extLst>
+          </p:cNvPr>
+          <p:cNvSpPr>
+            <a:spLocks noGrp="1" noRot="1" noChangeAspect="1" noMove="1" noResize="1" noEditPoints="1" noAdjustHandles="1" noChangeArrowheads="1" noChangeShapeType="1" noTextEdit="1"/>
+          </p:cNvSpPr>
+          <p:nvPr>
+            <p:extLst>
+              <p:ext uri="{386F3935-93C4-4BCD-93E2-E3B085C9AB24}">
+                <p16:designElem xmlns:p16="http://schemas.microsoft.com/office/powerpoint/2015/main" val="1"/>
+              </p:ext>
+            </p:extLst>
+          </p:nvPr>
+        </p:nvSpPr>
+        <p:spPr>
+          <a:xfrm>
+            <a:off x="0" y="0"/>
+            <a:ext cx="12192000" cy="6858000"/>
+          </a:xfrm>
+          <a:prstGeom prst="rect">
+            <a:avLst/>
+          </a:prstGeom>
+          <a:ln w="12700" cap="flat" cmpd="sng" algn="ctr">
+            <a:noFill/>
+            <a:prstDash val="solid"/>
+            <a:miter lim="800000"/>
+          </a:ln>
+          <a:effectLst/>
+          <a:extLst>
+            <a:ext uri="{91240B29-F687-4F45-9708-019B960494DF}">
+              <a14:hiddenLine xmlns:a14="http://schemas.microsoft.com/office/drawing/2010/main" w="12700" cap="flat" cmpd="sng" algn="ctr">
+                <a:solidFill>
+                  <a:schemeClr val="accent1">
+                    <a:shade val="50000"/>
+                  </a:schemeClr>
+                </a:solidFill>
+                <a:prstDash val="solid"/>
+                <a:miter lim="800000"/>
+              </a14:hiddenLine>
+            </a:ext>
+          </a:extLst>
+        </p:spPr>
+        <p:style>
+          <a:lnRef idx="2">
+            <a:schemeClr val="accent1">
+              <a:shade val="50000"/>
+            </a:schemeClr>
+          </a:lnRef>
+          <a:fillRef idx="1">
+            <a:schemeClr val="accent1"/>
+          </a:fillRef>
+          <a:effectRef idx="0">
+            <a:schemeClr val="accent1"/>
+          </a:effectRef>
+          <a:fontRef idx="minor">
+            <a:schemeClr val="lt1"/>
+          </a:fontRef>
+        </p:style>
+        <p:txBody>
+          <a:bodyPr rtlCol="0" anchor="ctr"/>
+          <a:lstStyle/>
+          <a:p>
+            <a:pPr algn="ctr"/>
+            <a:endParaRPr lang="en-US"/>
+          </a:p>
+        </p:txBody>
+      </p:sp>
+      <p:sp>
+        <p:nvSpPr>
+          <p:cNvPr id="10" name="Rectangle 9">
+            <a:extLst>
+              <a:ext uri="{FF2B5EF4-FFF2-40B4-BE49-F238E27FC236}">
+                <a16:creationId xmlns:a16="http://schemas.microsoft.com/office/drawing/2014/main" id="{1EBE2DDC-0D14-44E6-A1AB-2EEC09507435}"/>
+              </a:ext>
+              <a:ext uri="{C183D7F6-B498-43B3-948B-1728B52AA6E4}">
+                <adec:decorative xmlns:adec="http://schemas.microsoft.com/office/drawing/2017/decorative" val="1"/>
+              </a:ext>
+            </a:extLst>
+          </p:cNvPr>
+          <p:cNvSpPr>
+            <a:spLocks noGrp="1" noRot="1" noChangeAspect="1" noMove="1" noResize="1" noEditPoints="1" noAdjustHandles="1" noChangeArrowheads="1" noChangeShapeType="1" noTextEdit="1"/>
+          </p:cNvSpPr>
+          <p:nvPr>
+            <p:extLst>
+              <p:ext uri="{386F3935-93C4-4BCD-93E2-E3B085C9AB24}">
+                <p16:designElem xmlns:p16="http://schemas.microsoft.com/office/powerpoint/2015/main" val="1"/>
+              </p:ext>
+            </p:extLst>
+          </p:nvPr>
+        </p:nvSpPr>
+        <p:spPr>
+          <a:xfrm rot="5400000" flipH="1">
+            <a:off x="-1409318" y="1410082"/>
+            <a:ext cx="6858000" cy="4037835"/>
+          </a:xfrm>
+          <a:prstGeom prst="rect">
+            <a:avLst/>
+          </a:prstGeom>
+          <a:gradFill>
+            <a:gsLst>
+              <a:gs pos="8000">
+                <a:schemeClr val="accent6"/>
+              </a:gs>
+              <a:gs pos="100000">
+                <a:schemeClr val="accent5">
+                  <a:alpha val="72000"/>
+                </a:schemeClr>
+              </a:gs>
+            </a:gsLst>
+            <a:lin ang="3600000" scaled="0"/>
+          </a:gradFill>
+          <a:ln>
+            <a:noFill/>
+          </a:ln>
+        </p:spPr>
+        <p:style>
+          <a:lnRef idx="2">
+            <a:schemeClr val="accent1">
+              <a:shade val="50000"/>
+            </a:schemeClr>
+          </a:lnRef>
+          <a:fillRef idx="1">
+            <a:schemeClr val="accent1"/>
+          </a:fillRef>
+          <a:effectRef idx="0">
+            <a:schemeClr val="accent1"/>
+          </a:effectRef>
+          <a:fontRef idx="minor">
+            <a:schemeClr val="lt1"/>
+          </a:fontRef>
+        </p:style>
+        <p:txBody>
+          <a:bodyPr rtlCol="0" anchor="ctr"/>
+          <a:lstStyle/>
+          <a:p>
+            <a:pPr algn="ctr"/>
+            <a:endParaRPr lang="en-US"/>
+          </a:p>
+        </p:txBody>
+      </p:sp>
+      <p:sp>
+        <p:nvSpPr>
+          <p:cNvPr id="12" name="Rectangle 11">
+            <a:extLst>
+              <a:ext uri="{FF2B5EF4-FFF2-40B4-BE49-F238E27FC236}">
+                <a16:creationId xmlns:a16="http://schemas.microsoft.com/office/drawing/2014/main" id="{A8543D98-0AA2-43B4-B508-DC1DB7F3DC9A}"/>
+              </a:ext>
+              <a:ext uri="{C183D7F6-B498-43B3-948B-1728B52AA6E4}">
+                <adec:decorative xmlns:adec="http://schemas.microsoft.com/office/drawing/2017/decorative" val="1"/>
+              </a:ext>
+            </a:extLst>
+          </p:cNvPr>
+          <p:cNvSpPr>
+            <a:spLocks noGrp="1" noRot="1" noChangeAspect="1" noMove="1" noResize="1" noEditPoints="1" noAdjustHandles="1" noChangeArrowheads="1" noChangeShapeType="1" noTextEdit="1"/>
+          </p:cNvSpPr>
+          <p:nvPr>
+            <p:extLst>
+              <p:ext uri="{386F3935-93C4-4BCD-93E2-E3B085C9AB24}">
+                <p16:designElem xmlns:p16="http://schemas.microsoft.com/office/powerpoint/2015/main" val="1"/>
+              </p:ext>
+            </p:extLst>
+          </p:nvPr>
+        </p:nvSpPr>
+        <p:spPr>
+          <a:xfrm rot="5400000" flipH="1">
+            <a:off x="-1412414" y="1406060"/>
+            <a:ext cx="6857572" cy="4045450"/>
+          </a:xfrm>
+          <a:prstGeom prst="rect">
+            <a:avLst/>
+          </a:prstGeom>
+          <a:gradFill>
+            <a:gsLst>
+              <a:gs pos="0">
+                <a:schemeClr val="accent4">
+                  <a:alpha val="0"/>
+                </a:schemeClr>
+              </a:gs>
+              <a:gs pos="96000">
+                <a:schemeClr val="accent2"/>
+              </a:gs>
+            </a:gsLst>
+            <a:lin ang="2400000" scaled="0"/>
+          </a:gradFill>
+          <a:ln>
+            <a:noFill/>
+          </a:ln>
+        </p:spPr>
+        <p:style>
+          <a:lnRef idx="2">
+            <a:schemeClr val="accent1">
+              <a:shade val="50000"/>
+            </a:schemeClr>
+          </a:lnRef>
+          <a:fillRef idx="1">
+            <a:schemeClr val="accent1"/>
+          </a:fillRef>
+          <a:effectRef idx="0">
+            <a:schemeClr val="accent1"/>
+          </a:effectRef>
+          <a:fontRef idx="minor">
+            <a:schemeClr val="lt1"/>
+          </a:fontRef>
+        </p:style>
+        <p:txBody>
+          <a:bodyPr rtlCol="0" anchor="ctr"/>
+          <a:lstStyle/>
+          <a:p>
+            <a:pPr algn="ctr"/>
+            <a:endParaRPr lang="en-US"/>
+          </a:p>
+        </p:txBody>
+      </p:sp>
+      <p:sp>
+        <p:nvSpPr>
+          <p:cNvPr id="14" name="Rectangle 13">
+            <a:extLst>
+              <a:ext uri="{FF2B5EF4-FFF2-40B4-BE49-F238E27FC236}">
+                <a16:creationId xmlns:a16="http://schemas.microsoft.com/office/drawing/2014/main" id="{89723C1D-9A1A-465B-8164-483BF5426613}"/>
+              </a:ext>
+              <a:ext uri="{C183D7F6-B498-43B3-948B-1728B52AA6E4}">
+                <adec:decorative xmlns:adec="http://schemas.microsoft.com/office/drawing/2017/decorative" val="1"/>
+              </a:ext>
+            </a:extLst>
+          </p:cNvPr>
+          <p:cNvSpPr>
+            <a:spLocks noGrp="1" noRot="1" noChangeAspect="1" noMove="1" noResize="1" noEditPoints="1" noAdjustHandles="1" noChangeArrowheads="1" noChangeShapeType="1" noTextEdit="1"/>
+          </p:cNvSpPr>
+          <p:nvPr>
+            <p:extLst>
+              <p:ext uri="{386F3935-93C4-4BCD-93E2-E3B085C9AB24}">
+                <p16:designElem xmlns:p16="http://schemas.microsoft.com/office/powerpoint/2015/main" val="1"/>
+              </p:ext>
+            </p:extLst>
+          </p:nvPr>
+        </p:nvSpPr>
+        <p:spPr>
+          <a:xfrm rot="5400000" flipH="1">
+            <a:off x="798889" y="3617790"/>
+            <a:ext cx="2453337" cy="4027079"/>
+          </a:xfrm>
+          <a:prstGeom prst="rect">
+            <a:avLst/>
+          </a:prstGeom>
+          <a:gradFill>
+            <a:gsLst>
+              <a:gs pos="2000">
+                <a:schemeClr val="accent5">
+                  <a:alpha val="35000"/>
+                </a:schemeClr>
+              </a:gs>
+              <a:gs pos="67000">
+                <a:schemeClr val="accent4">
+                  <a:alpha val="0"/>
+                </a:schemeClr>
+              </a:gs>
+            </a:gsLst>
+            <a:lin ang="7800000" scaled="0"/>
+          </a:gradFill>
+          <a:ln>
+            <a:noFill/>
+          </a:ln>
+        </p:spPr>
+        <p:style>
+          <a:lnRef idx="2">
+            <a:schemeClr val="accent1">
+              <a:shade val="50000"/>
+            </a:schemeClr>
+          </a:lnRef>
+          <a:fillRef idx="1">
+            <a:schemeClr val="accent1"/>
+          </a:fillRef>
+          <a:effectRef idx="0">
+            <a:schemeClr val="accent1"/>
+          </a:effectRef>
+          <a:fontRef idx="minor">
+            <a:schemeClr val="lt1"/>
+          </a:fontRef>
+        </p:style>
+        <p:txBody>
+          <a:bodyPr rtlCol="0" anchor="ctr"/>
+          <a:lstStyle/>
+          <a:p>
+            <a:pPr algn="ctr"/>
+            <a:endParaRPr lang="en-US"/>
+          </a:p>
+        </p:txBody>
+      </p:sp>
+      <p:sp>
+        <p:nvSpPr>
+          <p:cNvPr id="16" name="Freeform: Shape 15">
+            <a:extLst>
+              <a:ext uri="{FF2B5EF4-FFF2-40B4-BE49-F238E27FC236}">
+                <a16:creationId xmlns:a16="http://schemas.microsoft.com/office/drawing/2014/main" id="{A6680484-5F73-4078-85C2-415205B1A4C0}"/>
+              </a:ext>
+              <a:ext uri="{C183D7F6-B498-43B3-948B-1728B52AA6E4}">
+                <adec:decorative xmlns:adec="http://schemas.microsoft.com/office/drawing/2017/decorative" val="1"/>
+              </a:ext>
+            </a:extLst>
+          </p:cNvPr>
+          <p:cNvSpPr>
+            <a:spLocks noGrp="1" noRot="1" noChangeAspect="1" noMove="1" noResize="1" noEditPoints="1" noAdjustHandles="1" noChangeArrowheads="1" noChangeShapeType="1" noTextEdit="1"/>
+          </p:cNvSpPr>
+          <p:nvPr>
+            <p:extLst>
+              <p:ext uri="{386F3935-93C4-4BCD-93E2-E3B085C9AB24}">
+                <p16:designElem xmlns:p16="http://schemas.microsoft.com/office/powerpoint/2015/main" val="1"/>
+              </p:ext>
+            </p:extLst>
+          </p:nvPr>
+        </p:nvSpPr>
+        <p:spPr>
+          <a:xfrm rot="6097846">
+            <a:off x="-30441" y="1644149"/>
+            <a:ext cx="4384532" cy="4196758"/>
+          </a:xfrm>
+          <a:custGeom>
+            <a:avLst/>
+            <a:gdLst>
+              <a:gd name="connsiteX0" fmla="*/ 44539 w 4384532"/>
+              <a:gd name="connsiteY0" fmla="*/ 2446310 h 4196758"/>
+              <a:gd name="connsiteX1" fmla="*/ 0 w 4384532"/>
+              <a:gd name="connsiteY1" fmla="*/ 2004492 h 4196758"/>
+              <a:gd name="connsiteX2" fmla="*/ 500607 w 4384532"/>
+              <a:gd name="connsiteY2" fmla="*/ 610007 h 4196758"/>
+              <a:gd name="connsiteX3" fmla="*/ 589546 w 4384532"/>
+              <a:gd name="connsiteY3" fmla="*/ 512149 h 4196758"/>
+              <a:gd name="connsiteX4" fmla="*/ 3077760 w 4384532"/>
+              <a:gd name="connsiteY4" fmla="*/ 0 h 4196758"/>
+              <a:gd name="connsiteX5" fmla="*/ 3237230 w 4384532"/>
+              <a:gd name="connsiteY5" fmla="*/ 76821 h 4196758"/>
+              <a:gd name="connsiteX6" fmla="*/ 4384532 w 4384532"/>
+              <a:gd name="connsiteY6" fmla="*/ 2004492 h 4196758"/>
+              <a:gd name="connsiteX7" fmla="*/ 2192266 w 4384532"/>
+              <a:gd name="connsiteY7" fmla="*/ 4196758 h 4196758"/>
+              <a:gd name="connsiteX8" fmla="*/ 44539 w 4384532"/>
+              <a:gd name="connsiteY8" fmla="*/ 2446310 h 4196758"/>
+            </a:gdLst>
+            <a:ahLst/>
+            <a:cxnLst>
+              <a:cxn ang="0">
+                <a:pos x="connsiteX0" y="connsiteY0"/>
+              </a:cxn>
+              <a:cxn ang="0">
+                <a:pos x="connsiteX1" y="connsiteY1"/>
+              </a:cxn>
+              <a:cxn ang="0">
+                <a:pos x="connsiteX2" y="connsiteY2"/>
+              </a:cxn>
+              <a:cxn ang="0">
+                <a:pos x="connsiteX3" y="connsiteY3"/>
+              </a:cxn>
+              <a:cxn ang="0">
+                <a:pos x="connsiteX4" y="connsiteY4"/>
+              </a:cxn>
+              <a:cxn ang="0">
+                <a:pos x="connsiteX5" y="connsiteY5"/>
+              </a:cxn>
+              <a:cxn ang="0">
+                <a:pos x="connsiteX6" y="connsiteY6"/>
+              </a:cxn>
+              <a:cxn ang="0">
+                <a:pos x="connsiteX7" y="connsiteY7"/>
+              </a:cxn>
+              <a:cxn ang="0">
+                <a:pos x="connsiteX8" y="connsiteY8"/>
+              </a:cxn>
+            </a:cxnLst>
+            <a:rect l="l" t="t" r="r" b="b"/>
+            <a:pathLst>
+              <a:path w="4384532" h="4196758">
+                <a:moveTo>
+                  <a:pt x="44539" y="2446310"/>
+                </a:moveTo>
+                <a:cubicBezTo>
+                  <a:pt x="15336" y="2303599"/>
+                  <a:pt x="0" y="2155836"/>
+                  <a:pt x="0" y="2004492"/>
+                </a:cubicBezTo>
+                <a:cubicBezTo>
+                  <a:pt x="0" y="1474787"/>
+                  <a:pt x="187867" y="988960"/>
+                  <a:pt x="500607" y="610007"/>
+                </a:cubicBezTo>
+                <a:lnTo>
+                  <a:pt x="589546" y="512149"/>
+                </a:lnTo>
+                <a:lnTo>
+                  <a:pt x="3077760" y="0"/>
+                </a:lnTo>
+                <a:lnTo>
+                  <a:pt x="3237230" y="76821"/>
+                </a:lnTo>
+                <a:cubicBezTo>
+                  <a:pt x="3920615" y="448057"/>
+                  <a:pt x="4384532" y="1172098"/>
+                  <a:pt x="4384532" y="2004492"/>
+                </a:cubicBezTo>
+                <a:cubicBezTo>
+                  <a:pt x="4384532" y="3215247"/>
+                  <a:pt x="3403021" y="4196758"/>
+                  <a:pt x="2192266" y="4196758"/>
+                </a:cubicBezTo>
+                <a:cubicBezTo>
+                  <a:pt x="1132855" y="4196758"/>
+                  <a:pt x="248960" y="3445288"/>
+                  <a:pt x="44539" y="2446310"/>
+                </a:cubicBezTo>
+                <a:close/>
+              </a:path>
+            </a:pathLst>
+          </a:custGeom>
+          <a:gradFill>
+            <a:gsLst>
+              <a:gs pos="39000">
+                <a:schemeClr val="accent4">
+                  <a:lumMod val="20000"/>
+                  <a:lumOff val="80000"/>
+                  <a:alpha val="0"/>
+                </a:schemeClr>
+              </a:gs>
+              <a:gs pos="100000">
+                <a:schemeClr val="accent6">
+                  <a:alpha val="29000"/>
+                </a:schemeClr>
+              </a:gs>
+            </a:gsLst>
+            <a:lin ang="16800000" scaled="0"/>
+          </a:gradFill>
+          <a:ln>
+            <a:noFill/>
+          </a:ln>
+        </p:spPr>
+        <p:style>
+          <a:lnRef idx="2">
+            <a:schemeClr val="accent1">
+              <a:shade val="50000"/>
+            </a:schemeClr>
+          </a:lnRef>
+          <a:fillRef idx="1">
+            <a:schemeClr val="accent1"/>
+          </a:fillRef>
+          <a:effectRef idx="0">
+            <a:schemeClr val="accent1"/>
+          </a:effectRef>
+          <a:fontRef idx="minor">
+            <a:schemeClr val="lt1"/>
+          </a:fontRef>
+        </p:style>
+        <p:txBody>
+          <a:bodyPr wrap="square" rtlCol="0" anchor="ctr">
+            <a:noAutofit/>
+          </a:bodyPr>
+          <a:lstStyle/>
+          <a:p>
+            <a:pPr algn="ctr"/>
+            <a:endParaRPr lang="en-US" dirty="0"/>
+          </a:p>
+        </p:txBody>
+      </p:sp>
+      <p:sp>
+        <p:nvSpPr>
+          <p:cNvPr id="2" name="Title 1">
+            <a:extLst>
+              <a:ext uri="{FF2B5EF4-FFF2-40B4-BE49-F238E27FC236}">
+                <a16:creationId xmlns:a16="http://schemas.microsoft.com/office/drawing/2014/main" id="{ED13DC5A-070C-2820-7B21-77F350E19C35}"/>
+              </a:ext>
+            </a:extLst>
+          </p:cNvPr>
+          <p:cNvSpPr>
+            <a:spLocks noGrp="1"/>
+          </p:cNvSpPr>
+          <p:nvPr>
+            <p:ph type="title"/>
+          </p:nvPr>
+        </p:nvSpPr>
+        <p:spPr>
+          <a:xfrm>
+            <a:off x="387927" y="1028701"/>
+            <a:ext cx="3248863" cy="3020785"/>
+          </a:xfrm>
+        </p:spPr>
+        <p:txBody>
+          <a:bodyPr>
+            <a:normAutofit/>
+          </a:bodyPr>
+          <a:lstStyle/>
+          <a:p>
+            <a:pPr algn="r"/>
+            <a:r>
+              <a:rPr lang="en-US" sz="3200" dirty="0">
+                <a:solidFill>
+                  <a:schemeClr val="bg1"/>
+                </a:solidFill>
+              </a:rPr>
+              <a:t>Stack Diagram</a:t>
+            </a:r>
+          </a:p>
+        </p:txBody>
+      </p:sp>
+      <p:sp>
+        <p:nvSpPr>
+          <p:cNvPr id="3" name="Content Placeholder 2">
+            <a:extLst>
+              <a:ext uri="{FF2B5EF4-FFF2-40B4-BE49-F238E27FC236}">
+                <a16:creationId xmlns:a16="http://schemas.microsoft.com/office/drawing/2014/main" id="{0EBFFC06-BF85-DEDF-BA6C-7733EEDB956A}"/>
+              </a:ext>
+            </a:extLst>
+          </p:cNvPr>
+          <p:cNvSpPr>
+            <a:spLocks noGrp="1"/>
+          </p:cNvSpPr>
+          <p:nvPr>
+            <p:ph idx="1"/>
+          </p:nvPr>
+        </p:nvSpPr>
+        <p:spPr>
+          <a:xfrm>
+            <a:off x="4777409" y="1028702"/>
+            <a:ext cx="6273972" cy="4843462"/>
+          </a:xfrm>
+        </p:spPr>
+        <p:txBody>
+          <a:bodyPr>
+            <a:normAutofit/>
+          </a:bodyPr>
+          <a:lstStyle/>
+          <a:p>
+            <a:r>
+              <a:rPr lang="en-US" sz="1800" dirty="0"/>
+              <a:t>We can keep track of the scope of a variable by drawing out a stack diagram</a:t>
+            </a:r>
+          </a:p>
+          <a:p>
+            <a:r>
+              <a:rPr lang="en-US" sz="1800" dirty="0"/>
+              <a:t>A </a:t>
+            </a:r>
+            <a:r>
+              <a:rPr lang="en-US" sz="1800" b="1" dirty="0"/>
+              <a:t>stack diagram</a:t>
+            </a:r>
+            <a:r>
+              <a:rPr lang="en-US" sz="1800" dirty="0"/>
+              <a:t> is an extended version of a state diagram</a:t>
+            </a:r>
+          </a:p>
+          <a:p>
+            <a:pPr lvl="1"/>
+            <a:r>
+              <a:rPr lang="en-US" sz="1800" dirty="0"/>
+              <a:t>Instead of focusing on just the global section of our program, we now can map out how our program uses our defined functions</a:t>
+            </a:r>
+          </a:p>
+          <a:p>
+            <a:pPr lvl="1"/>
+            <a:endParaRPr lang="en-US" sz="1800" dirty="0"/>
+          </a:p>
+        </p:txBody>
+      </p:sp>
+    </p:spTree>
+    <p:extLst>
+      <p:ext uri="{BB962C8B-B14F-4D97-AF65-F5344CB8AC3E}">
+        <p14:creationId xmlns:p14="http://schemas.microsoft.com/office/powerpoint/2010/main" val="1856278647"/>
+      </p:ext>
+    </p:extLst>
+  </p:cSld>
+  <p:clrMapOvr>
+    <a:masterClrMapping/>
+  </p:clrMapOvr>
+</p:sld>
+</file>
+
+<file path=ppt/slides/slide12.xml><?xml version="1.0" encoding="utf-8"?>
+<p:sld xmlns:a="http://schemas.openxmlformats.org/drawingml/2006/main" xmlns:r="http://schemas.openxmlformats.org/officeDocument/2006/relationships" xmlns:p="http://schemas.openxmlformats.org/presentationml/2006/main">
+  <p:cSld>
+    <p:bg>
+      <p:bgPr>
+        <a:solidFill>
+          <a:schemeClr val="bg1"/>
+        </a:solidFill>
+        <a:effectLst/>
+      </p:bgPr>
+    </p:bg>
+    <p:spTree>
+      <p:nvGrpSpPr>
+        <p:cNvPr id="1" name=""/>
+        <p:cNvGrpSpPr/>
+        <p:nvPr/>
+      </p:nvGrpSpPr>
+      <p:grpSpPr>
+        <a:xfrm>
+          <a:off x="0" y="0"/>
+          <a:ext cx="0" cy="0"/>
+          <a:chOff x="0" y="0"/>
+          <a:chExt cx="0" cy="0"/>
+        </a:xfrm>
+      </p:grpSpPr>
+      <p:sp useBgFill="1">
+        <p:nvSpPr>
+          <p:cNvPr id="8" name="Rectangle 7">
+            <a:extLst>
+              <a:ext uri="{FF2B5EF4-FFF2-40B4-BE49-F238E27FC236}">
+                <a16:creationId xmlns:a16="http://schemas.microsoft.com/office/drawing/2014/main" id="{45C5CC17-FF17-43CF-B073-D9051465D5CC}"/>
+              </a:ext>
+              <a:ext uri="{C183D7F6-B498-43B3-948B-1728B52AA6E4}">
+                <adec:decorative xmlns:adec="http://schemas.microsoft.com/office/drawing/2017/decorative" val="1"/>
+              </a:ext>
+            </a:extLst>
+          </p:cNvPr>
+          <p:cNvSpPr>
+            <a:spLocks noGrp="1" noRot="1" noChangeAspect="1" noMove="1" noResize="1" noEditPoints="1" noAdjustHandles="1" noChangeArrowheads="1" noChangeShapeType="1" noTextEdit="1"/>
+          </p:cNvSpPr>
+          <p:nvPr>
+            <p:extLst>
+              <p:ext uri="{386F3935-93C4-4BCD-93E2-E3B085C9AB24}">
+                <p16:designElem xmlns:p16="http://schemas.microsoft.com/office/powerpoint/2015/main" val="1"/>
+              </p:ext>
+            </p:extLst>
+          </p:nvPr>
+        </p:nvSpPr>
+        <p:spPr>
+          <a:xfrm>
+            <a:off x="0" y="0"/>
+            <a:ext cx="12192000" cy="6858000"/>
+          </a:xfrm>
+          <a:prstGeom prst="rect">
+            <a:avLst/>
+          </a:prstGeom>
+          <a:ln w="12700" cap="flat" cmpd="sng" algn="ctr">
+            <a:noFill/>
+            <a:prstDash val="solid"/>
+            <a:miter lim="800000"/>
+          </a:ln>
+          <a:effectLst/>
+          <a:extLst>
+            <a:ext uri="{91240B29-F687-4F45-9708-019B960494DF}">
+              <a14:hiddenLine xmlns:a14="http://schemas.microsoft.com/office/drawing/2010/main" w="12700" cap="flat" cmpd="sng" algn="ctr">
+                <a:solidFill>
+                  <a:schemeClr val="accent1">
+                    <a:shade val="50000"/>
+                  </a:schemeClr>
+                </a:solidFill>
+                <a:prstDash val="solid"/>
+                <a:miter lim="800000"/>
+              </a14:hiddenLine>
+            </a:ext>
+          </a:extLst>
+        </p:spPr>
+        <p:style>
+          <a:lnRef idx="2">
+            <a:schemeClr val="accent1">
+              <a:shade val="50000"/>
+            </a:schemeClr>
+          </a:lnRef>
+          <a:fillRef idx="1">
+            <a:schemeClr val="accent1"/>
+          </a:fillRef>
+          <a:effectRef idx="0">
+            <a:schemeClr val="accent1"/>
+          </a:effectRef>
+          <a:fontRef idx="minor">
+            <a:schemeClr val="lt1"/>
+          </a:fontRef>
+        </p:style>
+        <p:txBody>
+          <a:bodyPr rtlCol="0" anchor="ctr"/>
+          <a:lstStyle/>
+          <a:p>
+            <a:pPr algn="ctr"/>
+            <a:endParaRPr lang="en-US"/>
+          </a:p>
+        </p:txBody>
+      </p:sp>
+      <p:sp>
+        <p:nvSpPr>
+          <p:cNvPr id="10" name="Rectangle 9">
+            <a:extLst>
+              <a:ext uri="{FF2B5EF4-FFF2-40B4-BE49-F238E27FC236}">
+                <a16:creationId xmlns:a16="http://schemas.microsoft.com/office/drawing/2014/main" id="{1EBE2DDC-0D14-44E6-A1AB-2EEC09507435}"/>
+              </a:ext>
+              <a:ext uri="{C183D7F6-B498-43B3-948B-1728B52AA6E4}">
+                <adec:decorative xmlns:adec="http://schemas.microsoft.com/office/drawing/2017/decorative" val="1"/>
+              </a:ext>
+            </a:extLst>
+          </p:cNvPr>
+          <p:cNvSpPr>
+            <a:spLocks noGrp="1" noRot="1" noChangeAspect="1" noMove="1" noResize="1" noEditPoints="1" noAdjustHandles="1" noChangeArrowheads="1" noChangeShapeType="1" noTextEdit="1"/>
+          </p:cNvSpPr>
+          <p:nvPr>
+            <p:extLst>
+              <p:ext uri="{386F3935-93C4-4BCD-93E2-E3B085C9AB24}">
+                <p16:designElem xmlns:p16="http://schemas.microsoft.com/office/powerpoint/2015/main" val="1"/>
+              </p:ext>
+            </p:extLst>
+          </p:nvPr>
+        </p:nvSpPr>
+        <p:spPr>
+          <a:xfrm rot="5400000" flipH="1">
+            <a:off x="-1409318" y="1410082"/>
+            <a:ext cx="6858000" cy="4037835"/>
+          </a:xfrm>
+          <a:prstGeom prst="rect">
+            <a:avLst/>
+          </a:prstGeom>
+          <a:gradFill>
+            <a:gsLst>
+              <a:gs pos="8000">
+                <a:schemeClr val="accent6"/>
+              </a:gs>
+              <a:gs pos="100000">
+                <a:schemeClr val="accent5">
+                  <a:alpha val="72000"/>
+                </a:schemeClr>
+              </a:gs>
+            </a:gsLst>
+            <a:lin ang="3600000" scaled="0"/>
+          </a:gradFill>
+          <a:ln>
+            <a:noFill/>
+          </a:ln>
+        </p:spPr>
+        <p:style>
+          <a:lnRef idx="2">
+            <a:schemeClr val="accent1">
+              <a:shade val="50000"/>
+            </a:schemeClr>
+          </a:lnRef>
+          <a:fillRef idx="1">
+            <a:schemeClr val="accent1"/>
+          </a:fillRef>
+          <a:effectRef idx="0">
+            <a:schemeClr val="accent1"/>
+          </a:effectRef>
+          <a:fontRef idx="minor">
+            <a:schemeClr val="lt1"/>
+          </a:fontRef>
+        </p:style>
+        <p:txBody>
+          <a:bodyPr rtlCol="0" anchor="ctr"/>
+          <a:lstStyle/>
+          <a:p>
+            <a:pPr algn="ctr"/>
+            <a:endParaRPr lang="en-US"/>
+          </a:p>
+        </p:txBody>
+      </p:sp>
+      <p:sp>
+        <p:nvSpPr>
+          <p:cNvPr id="12" name="Rectangle 11">
+            <a:extLst>
+              <a:ext uri="{FF2B5EF4-FFF2-40B4-BE49-F238E27FC236}">
+                <a16:creationId xmlns:a16="http://schemas.microsoft.com/office/drawing/2014/main" id="{A8543D98-0AA2-43B4-B508-DC1DB7F3DC9A}"/>
+              </a:ext>
+              <a:ext uri="{C183D7F6-B498-43B3-948B-1728B52AA6E4}">
+                <adec:decorative xmlns:adec="http://schemas.microsoft.com/office/drawing/2017/decorative" val="1"/>
+              </a:ext>
+            </a:extLst>
+          </p:cNvPr>
+          <p:cNvSpPr>
+            <a:spLocks noGrp="1" noRot="1" noChangeAspect="1" noMove="1" noResize="1" noEditPoints="1" noAdjustHandles="1" noChangeArrowheads="1" noChangeShapeType="1" noTextEdit="1"/>
+          </p:cNvSpPr>
+          <p:nvPr>
+            <p:extLst>
+              <p:ext uri="{386F3935-93C4-4BCD-93E2-E3B085C9AB24}">
+                <p16:designElem xmlns:p16="http://schemas.microsoft.com/office/powerpoint/2015/main" val="1"/>
+              </p:ext>
+            </p:extLst>
+          </p:nvPr>
+        </p:nvSpPr>
+        <p:spPr>
+          <a:xfrm rot="5400000" flipH="1">
+            <a:off x="-1412414" y="1406060"/>
+            <a:ext cx="6857572" cy="4045450"/>
+          </a:xfrm>
+          <a:prstGeom prst="rect">
+            <a:avLst/>
+          </a:prstGeom>
+          <a:gradFill>
+            <a:gsLst>
+              <a:gs pos="0">
+                <a:schemeClr val="accent4">
+                  <a:alpha val="0"/>
+                </a:schemeClr>
+              </a:gs>
+              <a:gs pos="96000">
+                <a:schemeClr val="accent2"/>
+              </a:gs>
+            </a:gsLst>
+            <a:lin ang="2400000" scaled="0"/>
+          </a:gradFill>
+          <a:ln>
+            <a:noFill/>
+          </a:ln>
+        </p:spPr>
+        <p:style>
+          <a:lnRef idx="2">
+            <a:schemeClr val="accent1">
+              <a:shade val="50000"/>
+            </a:schemeClr>
+          </a:lnRef>
+          <a:fillRef idx="1">
+            <a:schemeClr val="accent1"/>
+          </a:fillRef>
+          <a:effectRef idx="0">
+            <a:schemeClr val="accent1"/>
+          </a:effectRef>
+          <a:fontRef idx="minor">
+            <a:schemeClr val="lt1"/>
+          </a:fontRef>
+        </p:style>
+        <p:txBody>
+          <a:bodyPr rtlCol="0" anchor="ctr"/>
+          <a:lstStyle/>
+          <a:p>
+            <a:pPr algn="ctr"/>
+            <a:endParaRPr lang="en-US"/>
+          </a:p>
+        </p:txBody>
+      </p:sp>
+      <p:sp>
+        <p:nvSpPr>
+          <p:cNvPr id="14" name="Rectangle 13">
+            <a:extLst>
+              <a:ext uri="{FF2B5EF4-FFF2-40B4-BE49-F238E27FC236}">
+                <a16:creationId xmlns:a16="http://schemas.microsoft.com/office/drawing/2014/main" id="{89723C1D-9A1A-465B-8164-483BF5426613}"/>
+              </a:ext>
+              <a:ext uri="{C183D7F6-B498-43B3-948B-1728B52AA6E4}">
+                <adec:decorative xmlns:adec="http://schemas.microsoft.com/office/drawing/2017/decorative" val="1"/>
+              </a:ext>
+            </a:extLst>
+          </p:cNvPr>
+          <p:cNvSpPr>
+            <a:spLocks noGrp="1" noRot="1" noChangeAspect="1" noMove="1" noResize="1" noEditPoints="1" noAdjustHandles="1" noChangeArrowheads="1" noChangeShapeType="1" noTextEdit="1"/>
+          </p:cNvSpPr>
+          <p:nvPr>
+            <p:extLst>
+              <p:ext uri="{386F3935-93C4-4BCD-93E2-E3B085C9AB24}">
+                <p16:designElem xmlns:p16="http://schemas.microsoft.com/office/powerpoint/2015/main" val="1"/>
+              </p:ext>
+            </p:extLst>
+          </p:nvPr>
+        </p:nvSpPr>
+        <p:spPr>
+          <a:xfrm rot="5400000" flipH="1">
+            <a:off x="798889" y="3617790"/>
+            <a:ext cx="2453337" cy="4027079"/>
+          </a:xfrm>
+          <a:prstGeom prst="rect">
+            <a:avLst/>
+          </a:prstGeom>
+          <a:gradFill>
+            <a:gsLst>
+              <a:gs pos="2000">
+                <a:schemeClr val="accent5">
+                  <a:alpha val="35000"/>
+                </a:schemeClr>
+              </a:gs>
+              <a:gs pos="67000">
+                <a:schemeClr val="accent4">
+                  <a:alpha val="0"/>
+                </a:schemeClr>
+              </a:gs>
+            </a:gsLst>
+            <a:lin ang="7800000" scaled="0"/>
+          </a:gradFill>
+          <a:ln>
+            <a:noFill/>
+          </a:ln>
+        </p:spPr>
+        <p:style>
+          <a:lnRef idx="2">
+            <a:schemeClr val="accent1">
+              <a:shade val="50000"/>
+            </a:schemeClr>
+          </a:lnRef>
+          <a:fillRef idx="1">
+            <a:schemeClr val="accent1"/>
+          </a:fillRef>
+          <a:effectRef idx="0">
+            <a:schemeClr val="accent1"/>
+          </a:effectRef>
+          <a:fontRef idx="minor">
+            <a:schemeClr val="lt1"/>
+          </a:fontRef>
+        </p:style>
+        <p:txBody>
+          <a:bodyPr rtlCol="0" anchor="ctr"/>
+          <a:lstStyle/>
+          <a:p>
+            <a:pPr algn="ctr"/>
+            <a:endParaRPr lang="en-US"/>
+          </a:p>
+        </p:txBody>
+      </p:sp>
+      <p:sp>
+        <p:nvSpPr>
+          <p:cNvPr id="16" name="Freeform: Shape 15">
+            <a:extLst>
+              <a:ext uri="{FF2B5EF4-FFF2-40B4-BE49-F238E27FC236}">
+                <a16:creationId xmlns:a16="http://schemas.microsoft.com/office/drawing/2014/main" id="{A6680484-5F73-4078-85C2-415205B1A4C0}"/>
+              </a:ext>
+              <a:ext uri="{C183D7F6-B498-43B3-948B-1728B52AA6E4}">
+                <adec:decorative xmlns:adec="http://schemas.microsoft.com/office/drawing/2017/decorative" val="1"/>
+              </a:ext>
+            </a:extLst>
+          </p:cNvPr>
+          <p:cNvSpPr>
+            <a:spLocks noGrp="1" noRot="1" noChangeAspect="1" noMove="1" noResize="1" noEditPoints="1" noAdjustHandles="1" noChangeArrowheads="1" noChangeShapeType="1" noTextEdit="1"/>
+          </p:cNvSpPr>
+          <p:nvPr>
+            <p:extLst>
+              <p:ext uri="{386F3935-93C4-4BCD-93E2-E3B085C9AB24}">
+                <p16:designElem xmlns:p16="http://schemas.microsoft.com/office/powerpoint/2015/main" val="1"/>
+              </p:ext>
+            </p:extLst>
+          </p:nvPr>
+        </p:nvSpPr>
+        <p:spPr>
+          <a:xfrm rot="6097846">
+            <a:off x="-30441" y="1644149"/>
+            <a:ext cx="4384532" cy="4196758"/>
+          </a:xfrm>
+          <a:custGeom>
+            <a:avLst/>
+            <a:gdLst>
+              <a:gd name="connsiteX0" fmla="*/ 44539 w 4384532"/>
+              <a:gd name="connsiteY0" fmla="*/ 2446310 h 4196758"/>
+              <a:gd name="connsiteX1" fmla="*/ 0 w 4384532"/>
+              <a:gd name="connsiteY1" fmla="*/ 2004492 h 4196758"/>
+              <a:gd name="connsiteX2" fmla="*/ 500607 w 4384532"/>
+              <a:gd name="connsiteY2" fmla="*/ 610007 h 4196758"/>
+              <a:gd name="connsiteX3" fmla="*/ 589546 w 4384532"/>
+              <a:gd name="connsiteY3" fmla="*/ 512149 h 4196758"/>
+              <a:gd name="connsiteX4" fmla="*/ 3077760 w 4384532"/>
+              <a:gd name="connsiteY4" fmla="*/ 0 h 4196758"/>
+              <a:gd name="connsiteX5" fmla="*/ 3237230 w 4384532"/>
+              <a:gd name="connsiteY5" fmla="*/ 76821 h 4196758"/>
+              <a:gd name="connsiteX6" fmla="*/ 4384532 w 4384532"/>
+              <a:gd name="connsiteY6" fmla="*/ 2004492 h 4196758"/>
+              <a:gd name="connsiteX7" fmla="*/ 2192266 w 4384532"/>
+              <a:gd name="connsiteY7" fmla="*/ 4196758 h 4196758"/>
+              <a:gd name="connsiteX8" fmla="*/ 44539 w 4384532"/>
+              <a:gd name="connsiteY8" fmla="*/ 2446310 h 4196758"/>
+            </a:gdLst>
+            <a:ahLst/>
+            <a:cxnLst>
+              <a:cxn ang="0">
+                <a:pos x="connsiteX0" y="connsiteY0"/>
+              </a:cxn>
+              <a:cxn ang="0">
+                <a:pos x="connsiteX1" y="connsiteY1"/>
+              </a:cxn>
+              <a:cxn ang="0">
+                <a:pos x="connsiteX2" y="connsiteY2"/>
+              </a:cxn>
+              <a:cxn ang="0">
+                <a:pos x="connsiteX3" y="connsiteY3"/>
+              </a:cxn>
+              <a:cxn ang="0">
+                <a:pos x="connsiteX4" y="connsiteY4"/>
+              </a:cxn>
+              <a:cxn ang="0">
+                <a:pos x="connsiteX5" y="connsiteY5"/>
+              </a:cxn>
+              <a:cxn ang="0">
+                <a:pos x="connsiteX6" y="connsiteY6"/>
+              </a:cxn>
+              <a:cxn ang="0">
+                <a:pos x="connsiteX7" y="connsiteY7"/>
+              </a:cxn>
+              <a:cxn ang="0">
+                <a:pos x="connsiteX8" y="connsiteY8"/>
+              </a:cxn>
+            </a:cxnLst>
+            <a:rect l="l" t="t" r="r" b="b"/>
+            <a:pathLst>
+              <a:path w="4384532" h="4196758">
+                <a:moveTo>
+                  <a:pt x="44539" y="2446310"/>
+                </a:moveTo>
+                <a:cubicBezTo>
+                  <a:pt x="15336" y="2303599"/>
+                  <a:pt x="0" y="2155836"/>
+                  <a:pt x="0" y="2004492"/>
+                </a:cubicBezTo>
+                <a:cubicBezTo>
+                  <a:pt x="0" y="1474787"/>
+                  <a:pt x="187867" y="988960"/>
+                  <a:pt x="500607" y="610007"/>
+                </a:cubicBezTo>
+                <a:lnTo>
+                  <a:pt x="589546" y="512149"/>
+                </a:lnTo>
+                <a:lnTo>
+                  <a:pt x="3077760" y="0"/>
+                </a:lnTo>
+                <a:lnTo>
+                  <a:pt x="3237230" y="76821"/>
+                </a:lnTo>
+                <a:cubicBezTo>
+                  <a:pt x="3920615" y="448057"/>
+                  <a:pt x="4384532" y="1172098"/>
+                  <a:pt x="4384532" y="2004492"/>
+                </a:cubicBezTo>
+                <a:cubicBezTo>
+                  <a:pt x="4384532" y="3215247"/>
+                  <a:pt x="3403021" y="4196758"/>
+                  <a:pt x="2192266" y="4196758"/>
+                </a:cubicBezTo>
+                <a:cubicBezTo>
+                  <a:pt x="1132855" y="4196758"/>
+                  <a:pt x="248960" y="3445288"/>
+                  <a:pt x="44539" y="2446310"/>
+                </a:cubicBezTo>
+                <a:close/>
+              </a:path>
+            </a:pathLst>
+          </a:custGeom>
+          <a:gradFill>
+            <a:gsLst>
+              <a:gs pos="39000">
+                <a:schemeClr val="accent4">
+                  <a:lumMod val="20000"/>
+                  <a:lumOff val="80000"/>
+                  <a:alpha val="0"/>
+                </a:schemeClr>
+              </a:gs>
+              <a:gs pos="100000">
+                <a:schemeClr val="accent6">
+                  <a:alpha val="29000"/>
+                </a:schemeClr>
+              </a:gs>
+            </a:gsLst>
+            <a:lin ang="16800000" scaled="0"/>
+          </a:gradFill>
+          <a:ln>
+            <a:noFill/>
+          </a:ln>
+        </p:spPr>
+        <p:style>
+          <a:lnRef idx="2">
+            <a:schemeClr val="accent1">
+              <a:shade val="50000"/>
+            </a:schemeClr>
+          </a:lnRef>
+          <a:fillRef idx="1">
+            <a:schemeClr val="accent1"/>
+          </a:fillRef>
+          <a:effectRef idx="0">
+            <a:schemeClr val="accent1"/>
+          </a:effectRef>
+          <a:fontRef idx="minor">
+            <a:schemeClr val="lt1"/>
+          </a:fontRef>
+        </p:style>
+        <p:txBody>
+          <a:bodyPr wrap="square" rtlCol="0" anchor="ctr">
+            <a:noAutofit/>
+          </a:bodyPr>
+          <a:lstStyle/>
+          <a:p>
+            <a:pPr algn="ctr"/>
+            <a:endParaRPr lang="en-US" dirty="0"/>
+          </a:p>
+        </p:txBody>
+      </p:sp>
+      <p:sp>
+        <p:nvSpPr>
+          <p:cNvPr id="2" name="Title 1">
+            <a:extLst>
+              <a:ext uri="{FF2B5EF4-FFF2-40B4-BE49-F238E27FC236}">
                 <a16:creationId xmlns:a16="http://schemas.microsoft.com/office/drawing/2014/main" id="{8282CB63-34A8-A018-EFBA-40F521C46B5A}"/>
               </a:ext>
             </a:extLst>
@@ -4694,7 +5967,7 @@
 </p:sld>
 </file>
 
-<file path=ppt/slides/slide11.xml><?xml version="1.0" encoding="utf-8"?>
+<file path=ppt/slides/slide13.xml><?xml version="1.0" encoding="utf-8"?>
 <p:sld xmlns:a="http://schemas.openxmlformats.org/drawingml/2006/main" xmlns:r="http://schemas.openxmlformats.org/officeDocument/2006/relationships" xmlns:p="http://schemas.openxmlformats.org/presentationml/2006/main">
   <p:cSld>
     <p:bg>
@@ -5427,7 +6700,7 @@
 </p:sld>
 </file>
 
-<file path=ppt/slides/slide12.xml><?xml version="1.0" encoding="utf-8"?>
+<file path=ppt/slides/slide14.xml><?xml version="1.0" encoding="utf-8"?>
 <p:sld xmlns:a="http://schemas.openxmlformats.org/drawingml/2006/main" xmlns:r="http://schemas.openxmlformats.org/officeDocument/2006/relationships" xmlns:p="http://schemas.openxmlformats.org/presentationml/2006/main">
   <p:cSld>
     <p:bg>
@@ -11158,7 +12431,7 @@
           <p:cNvPr id="2" name="Title 1">
             <a:extLst>
               <a:ext uri="{FF2B5EF4-FFF2-40B4-BE49-F238E27FC236}">
-                <a16:creationId xmlns:a16="http://schemas.microsoft.com/office/drawing/2014/main" id="{244EACCD-6162-3AAD-7D21-E286462AA6D4}"/>
+                <a16:creationId xmlns:a16="http://schemas.microsoft.com/office/drawing/2014/main" id="{CC01DD97-9647-9BF1-A027-F9BFDAE3ADBE}"/>
               </a:ext>
             </a:extLst>
           </p:cNvPr>
@@ -11188,7 +12461,7 @@
                   <a:schemeClr val="bg1"/>
                 </a:solidFill>
               </a:rPr>
-              <a:t>Variable life cycle and scope</a:t>
+              <a:t>Creating Functions</a:t>
             </a:r>
           </a:p>
         </p:txBody>
@@ -11198,7 +12471,7 @@
           <p:cNvPr id="3" name="Content Placeholder 2">
             <a:extLst>
               <a:ext uri="{FF2B5EF4-FFF2-40B4-BE49-F238E27FC236}">
-                <a16:creationId xmlns:a16="http://schemas.microsoft.com/office/drawing/2014/main" id="{7498C99E-C5C4-E993-11E2-7B3431194F4D}"/>
+                <a16:creationId xmlns:a16="http://schemas.microsoft.com/office/drawing/2014/main" id="{FF0A8F69-B487-C17F-706F-3638E08AA4ED}"/>
               </a:ext>
             </a:extLst>
           </p:cNvPr>
@@ -11211,96 +12484,81 @@
         </p:nvSpPr>
         <p:spPr>
           <a:xfrm>
-            <a:off x="4777409" y="1028701"/>
-            <a:ext cx="6273972" cy="5012869"/>
+            <a:off x="4777409" y="1028702"/>
+            <a:ext cx="6273972" cy="4843462"/>
           </a:xfrm>
         </p:spPr>
         <p:txBody>
           <a:bodyPr>
-            <a:normAutofit lnSpcReduction="10000"/>
+            <a:normAutofit/>
           </a:bodyPr>
           <a:lstStyle/>
           <a:p>
             <a:r>
               <a:rPr lang="en-US" sz="1800" dirty="0"/>
-              <a:t>When we start making our own functions we need to keep in mind the </a:t>
+              <a:t>In order to create a function, we first identify a section of code that we want to use within our function</a:t>
+            </a:r>
+          </a:p>
+          <a:p>
+            <a:pPr lvl="1"/>
+            <a:r>
+              <a:rPr lang="en-US" sz="1800" dirty="0"/>
+              <a:t>This process is known as </a:t>
+            </a:r>
+            <a:r>
+              <a:rPr lang="en-US" sz="1800" i="1" dirty="0"/>
+              <a:t>encapsulation</a:t>
+            </a:r>
+            <a:endParaRPr lang="en-US" sz="1800" dirty="0"/>
+          </a:p>
+          <a:p>
+            <a:pPr lvl="1"/>
+            <a:r>
+              <a:rPr lang="en-US" sz="1800" dirty="0"/>
+              <a:t>We take a code snippet that we want to be able to reuse, and then </a:t>
+            </a:r>
+            <a:r>
+              <a:rPr lang="en-US" sz="1800" i="1" dirty="0"/>
+              <a:t>encapsulate</a:t>
+            </a:r>
+            <a:r>
+              <a:rPr lang="en-US" sz="1800" dirty="0"/>
+              <a:t> it within a function</a:t>
+            </a:r>
+          </a:p>
+          <a:p>
+            <a:r>
+              <a:rPr lang="en-US" sz="1800" dirty="0"/>
+              <a:t>After we create our function, we can then </a:t>
+            </a:r>
+            <a:r>
+              <a:rPr lang="en-US" sz="1800" i="1" dirty="0"/>
+              <a:t>generalize </a:t>
+            </a:r>
+            <a:r>
+              <a:rPr lang="en-US" sz="1800" dirty="0"/>
+              <a:t>it so it works for a number of different scenarios</a:t>
+            </a:r>
+          </a:p>
+          <a:p>
+            <a:r>
+              <a:rPr lang="en-US" sz="1800" dirty="0"/>
+              <a:t>Ideally we want to have </a:t>
             </a:r>
             <a:r>
               <a:rPr lang="en-US" sz="1800" b="1" dirty="0"/>
-              <a:t>scope</a:t>
+              <a:t>incremental development</a:t>
             </a:r>
             <a:r>
               <a:rPr lang="en-US" sz="1800" dirty="0"/>
-              <a:t> the variable belongs to</a:t>
-            </a:r>
-          </a:p>
-          <a:p>
+              <a:t> as we program</a:t>
+            </a:r>
+          </a:p>
+          <a:p>
+            <a:pPr lvl="1"/>
             <a:r>
               <a:rPr lang="en-US" sz="1800" dirty="0"/>
-              <a:t>A variable can be either </a:t>
-            </a:r>
-            <a:r>
-              <a:rPr lang="en-US" sz="1800" i="1" dirty="0"/>
-              <a:t>local</a:t>
-            </a:r>
-            <a:r>
-              <a:rPr lang="en-US" sz="1800" dirty="0"/>
-              <a:t> or </a:t>
-            </a:r>
-            <a:r>
-              <a:rPr lang="en-US" sz="1800" i="1" dirty="0"/>
-              <a:t>global</a:t>
-            </a:r>
-          </a:p>
-          <a:p>
-            <a:pPr lvl="1"/>
-            <a:r>
-              <a:rPr lang="en-US" sz="1800" dirty="0"/>
-              <a:t>A </a:t>
-            </a:r>
-            <a:r>
-              <a:rPr lang="en-US" sz="1800" i="1" dirty="0"/>
-              <a:t>local variable</a:t>
-            </a:r>
-            <a:r>
-              <a:rPr lang="en-US" sz="1800" dirty="0"/>
-              <a:t> is a variable that only exists within a function</a:t>
-            </a:r>
-          </a:p>
-          <a:p>
-            <a:pPr lvl="2"/>
-            <a:r>
-              <a:rPr lang="en-US" sz="1600" dirty="0"/>
-              <a:t>Once the function is no longer running, that variable ceases to exist</a:t>
-            </a:r>
-          </a:p>
-          <a:p>
-            <a:pPr lvl="1"/>
-            <a:r>
-              <a:rPr lang="en-US" sz="1800" dirty="0"/>
-              <a:t>A </a:t>
-            </a:r>
-            <a:r>
-              <a:rPr lang="en-US" sz="1800" i="1" dirty="0"/>
-              <a:t>global variable</a:t>
-            </a:r>
-            <a:r>
-              <a:rPr lang="en-US" sz="1800" dirty="0"/>
-              <a:t> is a variable that can be referred to in any part of our code</a:t>
-            </a:r>
-          </a:p>
-          <a:p>
-            <a:pPr lvl="2"/>
-            <a:r>
-              <a:rPr lang="en-US" sz="1600" dirty="0"/>
-              <a:t>Ideally we want to limit the number of global functions that we have, and instead pass arguments into functions and reference them as parameters</a:t>
-            </a:r>
-          </a:p>
-          <a:p>
-            <a:pPr lvl="1"/>
-            <a:r>
-              <a:rPr lang="en-US" sz="1800" dirty="0"/>
-              <a:t>Using local variables instead of global variables minimizes confusion for the programmer and prevents values from being overwritten</a:t>
+              <a:t>Create a number of small functions that each perform one task</a:t>
             </a:r>
           </a:p>
         </p:txBody>
@@ -11308,7 +12566,7 @@
     </p:spTree>
     <p:extLst>
       <p:ext uri="{BB962C8B-B14F-4D97-AF65-F5344CB8AC3E}">
-        <p14:creationId xmlns:p14="http://schemas.microsoft.com/office/powerpoint/2010/main" val="233753120"/>
+        <p14:creationId xmlns:p14="http://schemas.microsoft.com/office/powerpoint/2010/main" val="3015564876"/>
       </p:ext>
     </p:extLst>
   </p:cSld>
@@ -11817,7 +13075,7 @@
           <p:cNvPr id="2" name="Title 1">
             <a:extLst>
               <a:ext uri="{FF2B5EF4-FFF2-40B4-BE49-F238E27FC236}">
-                <a16:creationId xmlns:a16="http://schemas.microsoft.com/office/drawing/2014/main" id="{ED13DC5A-070C-2820-7B21-77F350E19C35}"/>
+                <a16:creationId xmlns:a16="http://schemas.microsoft.com/office/drawing/2014/main" id="{33BA7699-5B72-0BD8-5E13-26F0CCA3702D}"/>
               </a:ext>
             </a:extLst>
           </p:cNvPr>
@@ -11847,75 +13105,218 @@
                   <a:schemeClr val="bg1"/>
                 </a:solidFill>
               </a:rPr>
-              <a:t>Stack Diagram</a:t>
-            </a:r>
-          </a:p>
-        </p:txBody>
-      </p:sp>
-      <p:sp>
-        <p:nvSpPr>
-          <p:cNvPr id="3" name="Content Placeholder 2">
-            <a:extLst>
-              <a:ext uri="{FF2B5EF4-FFF2-40B4-BE49-F238E27FC236}">
-                <a16:creationId xmlns:a16="http://schemas.microsoft.com/office/drawing/2014/main" id="{0EBFFC06-BF85-DEDF-BA6C-7733EEDB956A}"/>
-              </a:ext>
-            </a:extLst>
-          </p:cNvPr>
-          <p:cNvSpPr>
-            <a:spLocks noGrp="1"/>
-          </p:cNvSpPr>
-          <p:nvPr>
-            <p:ph idx="1"/>
-          </p:nvPr>
+              <a:t>Program Structure</a:t>
+            </a:r>
+          </a:p>
+        </p:txBody>
+      </p:sp>
+      <p:sp>
+        <p:nvSpPr>
+          <p:cNvPr id="4" name="Rectangle 3">
+            <a:extLst>
+              <a:ext uri="{FF2B5EF4-FFF2-40B4-BE49-F238E27FC236}">
+                <a16:creationId xmlns:a16="http://schemas.microsoft.com/office/drawing/2014/main" id="{572B26FD-F3A5-274A-872B-BB2B0843FFDE}"/>
+              </a:ext>
+            </a:extLst>
+          </p:cNvPr>
+          <p:cNvSpPr/>
+          <p:nvPr/>
         </p:nvSpPr>
         <p:spPr>
           <a:xfrm>
-            <a:off x="4777409" y="1028702"/>
-            <a:ext cx="6273972" cy="4843462"/>
-          </a:xfrm>
-        </p:spPr>
-        <p:txBody>
-          <a:bodyPr>
-            <a:normAutofit/>
-          </a:bodyPr>
-          <a:lstStyle/>
-          <a:p>
-            <a:r>
-              <a:rPr lang="en-US" sz="1800" dirty="0"/>
-              <a:t>We can keep track of the scope of a variable by drawing out a stack diagram</a:t>
-            </a:r>
-          </a:p>
-          <a:p>
-            <a:r>
-              <a:rPr lang="en-US" sz="1800" dirty="0"/>
-              <a:t>A </a:t>
-            </a:r>
-            <a:r>
-              <a:rPr lang="en-US" sz="1800" b="1" dirty="0"/>
-              <a:t>stack diagram</a:t>
-            </a:r>
-            <a:r>
-              <a:rPr lang="en-US" sz="1800" dirty="0"/>
-              <a:t> is an extended version of a state diagram</a:t>
-            </a:r>
-          </a:p>
-          <a:p>
-            <a:pPr lvl="1"/>
-            <a:r>
-              <a:rPr lang="en-US" sz="1800" dirty="0"/>
-              <a:t>Instead of focusing on just the global section of our program, we now can map out how our program uses our defined functions</a:t>
-            </a:r>
-          </a:p>
-          <a:p>
-            <a:pPr lvl="1"/>
-            <a:endParaRPr lang="en-US" sz="1800" dirty="0"/>
+            <a:off x="5780314" y="841615"/>
+            <a:ext cx="3940629" cy="4789714"/>
+          </a:xfrm>
+          <a:prstGeom prst="rect">
+            <a:avLst/>
+          </a:prstGeom>
+          <a:noFill/>
+          <a:ln>
+            <a:solidFill>
+              <a:schemeClr val="tx1"/>
+            </a:solidFill>
+          </a:ln>
+        </p:spPr>
+        <p:style>
+          <a:lnRef idx="2">
+            <a:schemeClr val="accent6"/>
+          </a:lnRef>
+          <a:fillRef idx="1">
+            <a:schemeClr val="lt1"/>
+          </a:fillRef>
+          <a:effectRef idx="0">
+            <a:schemeClr val="accent6"/>
+          </a:effectRef>
+          <a:fontRef idx="minor">
+            <a:schemeClr val="dk1"/>
+          </a:fontRef>
+        </p:style>
+        <p:txBody>
+          <a:bodyPr rtlCol="0" anchor="ctr"/>
+          <a:lstStyle/>
+          <a:p>
+            <a:pPr algn="ctr"/>
+            <a:endParaRPr lang="en-US"/>
+          </a:p>
+        </p:txBody>
+      </p:sp>
+      <p:sp>
+        <p:nvSpPr>
+          <p:cNvPr id="6" name="Rectangle 5">
+            <a:extLst>
+              <a:ext uri="{FF2B5EF4-FFF2-40B4-BE49-F238E27FC236}">
+                <a16:creationId xmlns:a16="http://schemas.microsoft.com/office/drawing/2014/main" id="{B9A6FB40-0E0D-455F-344E-B4750A0F6A3B}"/>
+              </a:ext>
+            </a:extLst>
+          </p:cNvPr>
+          <p:cNvSpPr/>
+          <p:nvPr/>
+        </p:nvSpPr>
+        <p:spPr>
+          <a:xfrm>
+            <a:off x="5910943" y="1028701"/>
+            <a:ext cx="3624943" cy="702128"/>
+          </a:xfrm>
+          <a:prstGeom prst="rect">
+            <a:avLst/>
+          </a:prstGeom>
+          <a:solidFill>
+            <a:srgbClr val="00B050"/>
+          </a:solidFill>
+        </p:spPr>
+        <p:style>
+          <a:lnRef idx="2">
+            <a:schemeClr val="accent1">
+              <a:shade val="15000"/>
+            </a:schemeClr>
+          </a:lnRef>
+          <a:fillRef idx="1">
+            <a:schemeClr val="accent1"/>
+          </a:fillRef>
+          <a:effectRef idx="0">
+            <a:schemeClr val="accent1"/>
+          </a:effectRef>
+          <a:fontRef idx="minor">
+            <a:schemeClr val="lt1"/>
+          </a:fontRef>
+        </p:style>
+        <p:txBody>
+          <a:bodyPr rtlCol="0" anchor="ctr"/>
+          <a:lstStyle/>
+          <a:p>
+            <a:pPr algn="ctr"/>
+            <a:r>
+              <a:rPr lang="en-US" dirty="0"/>
+              <a:t>Import statements</a:t>
+            </a:r>
+          </a:p>
+        </p:txBody>
+      </p:sp>
+      <p:sp>
+        <p:nvSpPr>
+          <p:cNvPr id="7" name="Rectangle 6">
+            <a:extLst>
+              <a:ext uri="{FF2B5EF4-FFF2-40B4-BE49-F238E27FC236}">
+                <a16:creationId xmlns:a16="http://schemas.microsoft.com/office/drawing/2014/main" id="{2F461FB6-5277-101D-0210-38198F4A866D}"/>
+              </a:ext>
+            </a:extLst>
+          </p:cNvPr>
+          <p:cNvSpPr/>
+          <p:nvPr/>
+        </p:nvSpPr>
+        <p:spPr>
+          <a:xfrm>
+            <a:off x="5987143" y="1861457"/>
+            <a:ext cx="3570514" cy="1676400"/>
+          </a:xfrm>
+          <a:prstGeom prst="rect">
+            <a:avLst/>
+          </a:prstGeom>
+        </p:spPr>
+        <p:style>
+          <a:lnRef idx="2">
+            <a:schemeClr val="accent1">
+              <a:shade val="15000"/>
+            </a:schemeClr>
+          </a:lnRef>
+          <a:fillRef idx="1">
+            <a:schemeClr val="accent1"/>
+          </a:fillRef>
+          <a:effectRef idx="0">
+            <a:schemeClr val="accent1"/>
+          </a:effectRef>
+          <a:fontRef idx="minor">
+            <a:schemeClr val="lt1"/>
+          </a:fontRef>
+        </p:style>
+        <p:txBody>
+          <a:bodyPr rtlCol="0" anchor="ctr"/>
+          <a:lstStyle/>
+          <a:p>
+            <a:pPr algn="ctr"/>
+            <a:r>
+              <a:rPr lang="en-US" dirty="0"/>
+              <a:t>Function definitions</a:t>
+            </a:r>
+          </a:p>
+        </p:txBody>
+      </p:sp>
+      <p:sp>
+        <p:nvSpPr>
+          <p:cNvPr id="11" name="Rectangle 10">
+            <a:extLst>
+              <a:ext uri="{FF2B5EF4-FFF2-40B4-BE49-F238E27FC236}">
+                <a16:creationId xmlns:a16="http://schemas.microsoft.com/office/drawing/2014/main" id="{628C1B45-3354-C4A2-FB59-997BF2319B31}"/>
+              </a:ext>
+            </a:extLst>
+          </p:cNvPr>
+          <p:cNvSpPr/>
+          <p:nvPr/>
+        </p:nvSpPr>
+        <p:spPr>
+          <a:xfrm>
+            <a:off x="6096000" y="3742528"/>
+            <a:ext cx="3439886" cy="1798301"/>
+          </a:xfrm>
+          <a:prstGeom prst="rect">
+            <a:avLst/>
+          </a:prstGeom>
+          <a:solidFill>
+            <a:srgbClr val="00B0F0"/>
+          </a:solidFill>
+        </p:spPr>
+        <p:style>
+          <a:lnRef idx="2">
+            <a:schemeClr val="accent1">
+              <a:shade val="15000"/>
+            </a:schemeClr>
+          </a:lnRef>
+          <a:fillRef idx="1">
+            <a:schemeClr val="accent1"/>
+          </a:fillRef>
+          <a:effectRef idx="0">
+            <a:schemeClr val="accent1"/>
+          </a:effectRef>
+          <a:fontRef idx="minor">
+            <a:schemeClr val="lt1"/>
+          </a:fontRef>
+        </p:style>
+        <p:txBody>
+          <a:bodyPr rtlCol="0" anchor="ctr"/>
+          <a:lstStyle/>
+          <a:p>
+            <a:pPr algn="ctr"/>
+            <a:r>
+              <a:rPr lang="en-US" dirty="0"/>
+              <a:t>Top Level Code</a:t>
+            </a:r>
           </a:p>
         </p:txBody>
       </p:sp>
     </p:spTree>
     <p:extLst>
       <p:ext uri="{BB962C8B-B14F-4D97-AF65-F5344CB8AC3E}">
-        <p14:creationId xmlns:p14="http://schemas.microsoft.com/office/powerpoint/2010/main" val="1856278647"/>
+        <p14:creationId xmlns:p14="http://schemas.microsoft.com/office/powerpoint/2010/main" val="3448591385"/>
       </p:ext>
     </p:extLst>
   </p:cSld>

</xml_diff>